<commit_message>
my second lab exercise
</commit_message>
<xml_diff>
--- a/flowchart for labexercise 1.pptx
+++ b/flowchart for labexercise 1.pptx
@@ -6,6 +6,7 @@
   </p:sldMasterIdLst>
   <p:sldIdLst>
     <p:sldId id="256" r:id="rId3"/>
+    <p:sldId id="257" r:id="rId4"/>
   </p:sldIdLst>
   <p:sldSz cx="12192000" cy="6858000"/>
   <p:notesSz cx="6858000" cy="9144000"/>
@@ -2936,26 +2937,11 @@
           <a:bodyPr/>
           <a:lstStyle/>
           <a:p>
+            <a:r>
+              <a:rPr lang="en-US" dirty="0"/>
+              <a:t>exercise1</a:t>
+            </a:r>
             <a:endParaRPr lang="en-US" dirty="0"/>
-          </a:p>
-        </p:txBody>
-      </p:sp>
-      <p:sp>
-        <p:nvSpPr>
-          <p:cNvPr id="3" name="Subtitle 2"/>
-          <p:cNvSpPr>
-            <a:spLocks noGrp="1"/>
-          </p:cNvSpPr>
-          <p:nvPr>
-            <p:ph type="subTitle" idx="1"/>
-          </p:nvPr>
-        </p:nvSpPr>
-        <p:spPr/>
-        <p:txBody>
-          <a:bodyPr/>
-          <a:lstStyle/>
-          <a:p>
-            <a:endParaRPr lang="en-US"/>
           </a:p>
         </p:txBody>
       </p:sp>
@@ -3000,16 +2986,16 @@
       </p:sp>
       <p:sp>
         <p:nvSpPr>
-          <p:cNvPr id="5" name="Rectangles 4"/>
+          <p:cNvPr id="6" name="Parallelogram 5"/>
           <p:cNvSpPr/>
           <p:nvPr/>
         </p:nvSpPr>
         <p:spPr>
           <a:xfrm>
-            <a:off x="1957070" y="1507490"/>
-            <a:ext cx="5125720" cy="1288415"/>
-          </a:xfrm>
-          <a:prstGeom prst="rect">
+            <a:off x="1685290" y="1359535"/>
+            <a:ext cx="5097145" cy="1288415"/>
+          </a:xfrm>
+          <a:prstGeom prst="parallelogram">
             <a:avLst/>
           </a:prstGeom>
         </p:spPr>
@@ -3037,18 +3023,53 @@
           </a:p>
         </p:txBody>
       </p:sp>
-      <p:sp>
-        <p:nvSpPr>
-          <p:cNvPr id="6" name="Parallelogram 5"/>
+      <p:cxnSp>
+        <p:nvCxnSpPr>
+          <p:cNvPr id="8" name="Straight Arrow Connector 7"/>
+          <p:cNvCxnSpPr>
+            <a:stCxn id="6" idx="3"/>
+          </p:cNvCxnSpPr>
+          <p:nvPr/>
+        </p:nvCxnSpPr>
+        <p:spPr>
+          <a:xfrm>
+            <a:off x="4072890" y="2647950"/>
+            <a:ext cx="3175" cy="1251585"/>
+          </a:xfrm>
+          <a:prstGeom prst="straightConnector1">
+            <a:avLst/>
+          </a:prstGeom>
+          <a:ln>
+            <a:tailEnd type="arrow"/>
+          </a:ln>
+        </p:spPr>
+        <p:style>
+          <a:lnRef idx="1">
+            <a:schemeClr val="accent1"/>
+          </a:lnRef>
+          <a:fillRef idx="0">
+            <a:schemeClr val="accent1"/>
+          </a:fillRef>
+          <a:effectRef idx="0">
+            <a:schemeClr val="accent1"/>
+          </a:effectRef>
+          <a:fontRef idx="minor">
+            <a:schemeClr val="tx1"/>
+          </a:fontRef>
+        </p:style>
+      </p:cxnSp>
+      <p:sp>
+        <p:nvSpPr>
+          <p:cNvPr id="9" name="Flowchart: Decision 8"/>
           <p:cNvSpPr/>
           <p:nvPr/>
         </p:nvSpPr>
         <p:spPr>
           <a:xfrm>
-            <a:off x="2072005" y="3314700"/>
-            <a:ext cx="5097145" cy="1288415"/>
-          </a:xfrm>
-          <a:prstGeom prst="parallelogram">
+            <a:off x="3238500" y="4924425"/>
+            <a:ext cx="1990725" cy="916305"/>
+          </a:xfrm>
+          <a:prstGeom prst="flowChartDecision">
             <a:avLst/>
           </a:prstGeom>
         </p:spPr>
@@ -3078,16 +3099,16 @@
       </p:sp>
       <p:cxnSp>
         <p:nvCxnSpPr>
-          <p:cNvPr id="7" name="Straight Arrow Connector 6"/>
+          <p:cNvPr id="10" name="Straight Arrow Connector 9"/>
           <p:cNvCxnSpPr>
-            <a:stCxn id="3" idx="2"/>
+            <a:stCxn id="9" idx="3"/>
           </p:cNvCxnSpPr>
           <p:nvPr/>
         </p:nvCxnSpPr>
         <p:spPr>
-          <a:xfrm flipH="1" flipV="1">
-            <a:off x="4620260" y="5118100"/>
-            <a:ext cx="1475740" cy="139700"/>
+          <a:xfrm flipV="1">
+            <a:off x="5229225" y="5359400"/>
+            <a:ext cx="2016760" cy="23495"/>
           </a:xfrm>
           <a:prstGeom prst="straightConnector1">
             <a:avLst/>
@@ -3111,6 +3132,896 @@
           </a:fontRef>
         </p:style>
       </p:cxnSp>
+      <p:sp>
+        <p:nvSpPr>
+          <p:cNvPr id="11" name="Flowchart: Data 10"/>
+          <p:cNvSpPr/>
+          <p:nvPr/>
+        </p:nvSpPr>
+        <p:spPr>
+          <a:xfrm>
+            <a:off x="6782435" y="4987925"/>
+            <a:ext cx="4407535" cy="767080"/>
+          </a:xfrm>
+          <a:prstGeom prst="flowChartInputOutput">
+            <a:avLst/>
+          </a:prstGeom>
+        </p:spPr>
+        <p:style>
+          <a:lnRef idx="2">
+            <a:schemeClr val="accent1">
+              <a:shade val="50000"/>
+            </a:schemeClr>
+          </a:lnRef>
+          <a:fillRef idx="1">
+            <a:schemeClr val="accent1"/>
+          </a:fillRef>
+          <a:effectRef idx="0">
+            <a:schemeClr val="accent1"/>
+          </a:effectRef>
+          <a:fontRef idx="minor">
+            <a:schemeClr val="lt1"/>
+          </a:fontRef>
+        </p:style>
+        <p:txBody>
+          <a:bodyPr rtlCol="0" anchor="ctr"/>
+          <a:p>
+            <a:pPr algn="ctr"/>
+            <a:endParaRPr lang="en-US"/>
+          </a:p>
+        </p:txBody>
+      </p:sp>
+      <p:cxnSp>
+        <p:nvCxnSpPr>
+          <p:cNvPr id="3" name="Straight Arrow Connector 2"/>
+          <p:cNvCxnSpPr/>
+          <p:nvPr/>
+        </p:nvCxnSpPr>
+        <p:spPr>
+          <a:xfrm flipH="1" flipV="1">
+            <a:off x="2038350" y="5382895"/>
+            <a:ext cx="1657350" cy="15240"/>
+          </a:xfrm>
+          <a:prstGeom prst="straightConnector1">
+            <a:avLst/>
+          </a:prstGeom>
+          <a:ln>
+            <a:tailEnd type="arrow"/>
+          </a:ln>
+        </p:spPr>
+        <p:style>
+          <a:lnRef idx="1">
+            <a:schemeClr val="accent1"/>
+          </a:lnRef>
+          <a:fillRef idx="0">
+            <a:schemeClr val="accent1"/>
+          </a:fillRef>
+          <a:effectRef idx="0">
+            <a:schemeClr val="accent1"/>
+          </a:effectRef>
+          <a:fontRef idx="minor">
+            <a:schemeClr val="tx1"/>
+          </a:fontRef>
+        </p:style>
+      </p:cxnSp>
+      <p:sp>
+        <p:nvSpPr>
+          <p:cNvPr id="5" name="Parallelogram 4"/>
+          <p:cNvSpPr/>
+          <p:nvPr/>
+        </p:nvSpPr>
+        <p:spPr>
+          <a:xfrm>
+            <a:off x="161925" y="5223510"/>
+            <a:ext cx="2038350" cy="742950"/>
+          </a:xfrm>
+          <a:prstGeom prst="parallelogram">
+            <a:avLst/>
+          </a:prstGeom>
+        </p:spPr>
+        <p:style>
+          <a:lnRef idx="2">
+            <a:schemeClr val="accent1">
+              <a:shade val="50000"/>
+            </a:schemeClr>
+          </a:lnRef>
+          <a:fillRef idx="1">
+            <a:schemeClr val="accent1"/>
+          </a:fillRef>
+          <a:effectRef idx="0">
+            <a:schemeClr val="accent1"/>
+          </a:effectRef>
+          <a:fontRef idx="minor">
+            <a:schemeClr val="lt1"/>
+          </a:fontRef>
+        </p:style>
+        <p:txBody>
+          <a:bodyPr rtlCol="0" anchor="ctr"/>
+          <a:p>
+            <a:pPr algn="ctr"/>
+            <a:endParaRPr lang="en-US"/>
+          </a:p>
+        </p:txBody>
+      </p:sp>
+      <p:cxnSp>
+        <p:nvCxnSpPr>
+          <p:cNvPr id="7" name="Straight Arrow Connector 6"/>
+          <p:cNvCxnSpPr/>
+          <p:nvPr/>
+        </p:nvCxnSpPr>
+        <p:spPr>
+          <a:xfrm flipV="1">
+            <a:off x="7685405" y="6177280"/>
+            <a:ext cx="1047750" cy="47625"/>
+          </a:xfrm>
+          <a:prstGeom prst="straightConnector1">
+            <a:avLst/>
+          </a:prstGeom>
+          <a:ln>
+            <a:tailEnd type="arrow"/>
+          </a:ln>
+        </p:spPr>
+        <p:style>
+          <a:lnRef idx="1">
+            <a:schemeClr val="accent1"/>
+          </a:lnRef>
+          <a:fillRef idx="0">
+            <a:schemeClr val="accent1"/>
+          </a:fillRef>
+          <a:effectRef idx="0">
+            <a:schemeClr val="accent1"/>
+          </a:effectRef>
+          <a:fontRef idx="minor">
+            <a:schemeClr val="tx1"/>
+          </a:fontRef>
+        </p:style>
+      </p:cxnSp>
+      <p:cxnSp>
+        <p:nvCxnSpPr>
+          <p:cNvPr id="12" name="Straight Connector 11"/>
+          <p:cNvCxnSpPr/>
+          <p:nvPr/>
+        </p:nvCxnSpPr>
+        <p:spPr>
+          <a:xfrm>
+            <a:off x="1885950" y="5672455"/>
+            <a:ext cx="0" cy="0"/>
+          </a:xfrm>
+          <a:prstGeom prst="line">
+            <a:avLst/>
+          </a:prstGeom>
+        </p:spPr>
+        <p:style>
+          <a:lnRef idx="1">
+            <a:schemeClr val="accent1"/>
+          </a:lnRef>
+          <a:fillRef idx="0">
+            <a:schemeClr val="accent1"/>
+          </a:fillRef>
+          <a:effectRef idx="0">
+            <a:schemeClr val="accent1"/>
+          </a:effectRef>
+          <a:fontRef idx="minor">
+            <a:schemeClr val="tx1"/>
+          </a:fontRef>
+        </p:style>
+      </p:cxnSp>
+      <p:cxnSp>
+        <p:nvCxnSpPr>
+          <p:cNvPr id="15" name="Straight Connector 14"/>
+          <p:cNvCxnSpPr/>
+          <p:nvPr/>
+        </p:nvCxnSpPr>
+        <p:spPr>
+          <a:xfrm flipH="1">
+            <a:off x="4905375" y="5767705"/>
+            <a:ext cx="2676525" cy="885825"/>
+          </a:xfrm>
+          <a:prstGeom prst="line">
+            <a:avLst/>
+          </a:prstGeom>
+        </p:spPr>
+        <p:style>
+          <a:lnRef idx="1">
+            <a:schemeClr val="accent1"/>
+          </a:lnRef>
+          <a:fillRef idx="0">
+            <a:schemeClr val="accent1"/>
+          </a:fillRef>
+          <a:effectRef idx="0">
+            <a:schemeClr val="accent1"/>
+          </a:effectRef>
+          <a:fontRef idx="minor">
+            <a:schemeClr val="tx1"/>
+          </a:fontRef>
+        </p:style>
+      </p:cxnSp>
+      <p:cxnSp>
+        <p:nvCxnSpPr>
+          <p:cNvPr id="16" name="Straight Connector 15"/>
+          <p:cNvCxnSpPr>
+            <a:stCxn id="5" idx="2"/>
+          </p:cNvCxnSpPr>
+          <p:nvPr/>
+        </p:nvCxnSpPr>
+        <p:spPr>
+          <a:xfrm>
+            <a:off x="2107565" y="5594985"/>
+            <a:ext cx="2797810" cy="1058545"/>
+          </a:xfrm>
+          <a:prstGeom prst="line">
+            <a:avLst/>
+          </a:prstGeom>
+        </p:spPr>
+        <p:style>
+          <a:lnRef idx="1">
+            <a:schemeClr val="accent1"/>
+          </a:lnRef>
+          <a:fillRef idx="0">
+            <a:schemeClr val="accent1"/>
+          </a:fillRef>
+          <a:effectRef idx="0">
+            <a:schemeClr val="accent1"/>
+          </a:effectRef>
+          <a:fontRef idx="minor">
+            <a:schemeClr val="tx1"/>
+          </a:fontRef>
+        </p:style>
+      </p:cxnSp>
+      <p:sp>
+        <p:nvSpPr>
+          <p:cNvPr id="17" name="Flowchart: Connector 16"/>
+          <p:cNvSpPr/>
+          <p:nvPr/>
+        </p:nvSpPr>
+        <p:spPr>
+          <a:xfrm>
+            <a:off x="3810635" y="6400800"/>
+            <a:ext cx="1419225" cy="457200"/>
+          </a:xfrm>
+          <a:prstGeom prst="flowChartConnector">
+            <a:avLst/>
+          </a:prstGeom>
+        </p:spPr>
+        <p:style>
+          <a:lnRef idx="2">
+            <a:schemeClr val="accent1">
+              <a:shade val="50000"/>
+            </a:schemeClr>
+          </a:lnRef>
+          <a:fillRef idx="1">
+            <a:schemeClr val="accent1"/>
+          </a:fillRef>
+          <a:effectRef idx="0">
+            <a:schemeClr val="accent1"/>
+          </a:effectRef>
+          <a:fontRef idx="minor">
+            <a:schemeClr val="lt1"/>
+          </a:fontRef>
+        </p:style>
+        <p:txBody>
+          <a:bodyPr rtlCol="0" anchor="ctr"/>
+          <a:p>
+            <a:pPr algn="ctr"/>
+            <a:endParaRPr lang="en-US"/>
+          </a:p>
+        </p:txBody>
+      </p:sp>
+      <p:sp>
+        <p:nvSpPr>
+          <p:cNvPr id="18" name="Flowchart: Data 17"/>
+          <p:cNvSpPr/>
+          <p:nvPr/>
+        </p:nvSpPr>
+        <p:spPr>
+          <a:xfrm>
+            <a:off x="2333625" y="3899535"/>
+            <a:ext cx="3676650" cy="704850"/>
+          </a:xfrm>
+          <a:prstGeom prst="flowChartInputOutput">
+            <a:avLst/>
+          </a:prstGeom>
+        </p:spPr>
+        <p:style>
+          <a:lnRef idx="2">
+            <a:schemeClr val="accent1">
+              <a:shade val="50000"/>
+            </a:schemeClr>
+          </a:lnRef>
+          <a:fillRef idx="1">
+            <a:schemeClr val="accent1"/>
+          </a:fillRef>
+          <a:effectRef idx="0">
+            <a:schemeClr val="accent1"/>
+          </a:effectRef>
+          <a:fontRef idx="minor">
+            <a:schemeClr val="lt1"/>
+          </a:fontRef>
+        </p:style>
+        <p:txBody>
+          <a:bodyPr rtlCol="0" anchor="ctr"/>
+          <a:p>
+            <a:pPr algn="ctr"/>
+            <a:endParaRPr lang="en-US"/>
+          </a:p>
+        </p:txBody>
+      </p:sp>
+      <p:cxnSp>
+        <p:nvCxnSpPr>
+          <p:cNvPr id="19" name="Straight Connector 18"/>
+          <p:cNvCxnSpPr/>
+          <p:nvPr/>
+        </p:nvCxnSpPr>
+        <p:spPr>
+          <a:xfrm>
+            <a:off x="4121785" y="4604385"/>
+            <a:ext cx="100330" cy="265430"/>
+          </a:xfrm>
+          <a:prstGeom prst="line">
+            <a:avLst/>
+          </a:prstGeom>
+        </p:spPr>
+        <p:style>
+          <a:lnRef idx="1">
+            <a:schemeClr val="accent1"/>
+          </a:lnRef>
+          <a:fillRef idx="0">
+            <a:schemeClr val="accent1"/>
+          </a:fillRef>
+          <a:effectRef idx="0">
+            <a:schemeClr val="accent1"/>
+          </a:effectRef>
+          <a:fontRef idx="minor">
+            <a:schemeClr val="tx1"/>
+          </a:fontRef>
+        </p:style>
+      </p:cxnSp>
+    </p:spTree>
+  </p:cSld>
+  <p:clrMapOvr>
+    <a:masterClrMapping/>
+  </p:clrMapOvr>
+</p:sld>
+</file>
+
+<file path=ppt/slides/slide2.xml><?xml version="1.0" encoding="utf-8"?>
+<p:sld xmlns:a="http://schemas.openxmlformats.org/drawingml/2006/main" xmlns:r="http://schemas.openxmlformats.org/officeDocument/2006/relationships" xmlns:p="http://schemas.openxmlformats.org/presentationml/2006/main">
+  <p:cSld>
+    <p:spTree>
+      <p:nvGrpSpPr>
+        <p:cNvPr id="1" name=""/>
+        <p:cNvGrpSpPr/>
+        <p:nvPr/>
+      </p:nvGrpSpPr>
+      <p:grpSpPr/>
+      <p:sp>
+        <p:nvSpPr>
+          <p:cNvPr id="4" name="Oval 3"/>
+          <p:cNvSpPr/>
+          <p:nvPr/>
+        </p:nvSpPr>
+        <p:spPr>
+          <a:xfrm>
+            <a:off x="1297305" y="161925"/>
+            <a:ext cx="1628775" cy="714375"/>
+          </a:xfrm>
+          <a:prstGeom prst="ellipse">
+            <a:avLst/>
+          </a:prstGeom>
+        </p:spPr>
+        <p:style>
+          <a:lnRef idx="2">
+            <a:schemeClr val="accent1">
+              <a:shade val="50000"/>
+            </a:schemeClr>
+          </a:lnRef>
+          <a:fillRef idx="1">
+            <a:schemeClr val="accent1"/>
+          </a:fillRef>
+          <a:effectRef idx="0">
+            <a:schemeClr val="accent1"/>
+          </a:effectRef>
+          <a:fontRef idx="minor">
+            <a:schemeClr val="lt1"/>
+          </a:fontRef>
+        </p:style>
+        <p:txBody>
+          <a:bodyPr rtlCol="0" anchor="ctr"/>
+          <a:p>
+            <a:pPr algn="ctr"/>
+            <a:endParaRPr lang="en-US"/>
+          </a:p>
+        </p:txBody>
+      </p:sp>
+      <p:cxnSp>
+        <p:nvCxnSpPr>
+          <p:cNvPr id="5" name="Straight Connector 4"/>
+          <p:cNvCxnSpPr>
+            <a:stCxn id="4" idx="4"/>
+          </p:cNvCxnSpPr>
+          <p:nvPr/>
+        </p:nvCxnSpPr>
+        <p:spPr>
+          <a:xfrm flipH="1">
+            <a:off x="2106930" y="876300"/>
+            <a:ext cx="5080" cy="847725"/>
+          </a:xfrm>
+          <a:prstGeom prst="line">
+            <a:avLst/>
+          </a:prstGeom>
+        </p:spPr>
+        <p:style>
+          <a:lnRef idx="1">
+            <a:schemeClr val="accent1"/>
+          </a:lnRef>
+          <a:fillRef idx="0">
+            <a:schemeClr val="accent1"/>
+          </a:fillRef>
+          <a:effectRef idx="0">
+            <a:schemeClr val="accent1"/>
+          </a:effectRef>
+          <a:fontRef idx="minor">
+            <a:schemeClr val="tx1"/>
+          </a:fontRef>
+        </p:style>
+      </p:cxnSp>
+      <p:sp>
+        <p:nvSpPr>
+          <p:cNvPr id="6" name="Parallelogram 5"/>
+          <p:cNvSpPr/>
+          <p:nvPr/>
+        </p:nvSpPr>
+        <p:spPr>
+          <a:xfrm>
+            <a:off x="942340" y="1476375"/>
+            <a:ext cx="2185035" cy="552450"/>
+          </a:xfrm>
+          <a:prstGeom prst="parallelogram">
+            <a:avLst/>
+          </a:prstGeom>
+        </p:spPr>
+        <p:style>
+          <a:lnRef idx="2">
+            <a:schemeClr val="accent1">
+              <a:shade val="50000"/>
+            </a:schemeClr>
+          </a:lnRef>
+          <a:fillRef idx="1">
+            <a:schemeClr val="accent1"/>
+          </a:fillRef>
+          <a:effectRef idx="0">
+            <a:schemeClr val="accent1"/>
+          </a:effectRef>
+          <a:fontRef idx="minor">
+            <a:schemeClr val="lt1"/>
+          </a:fontRef>
+        </p:style>
+        <p:txBody>
+          <a:bodyPr rtlCol="0" anchor="ctr"/>
+          <a:p>
+            <a:pPr algn="ctr"/>
+            <a:endParaRPr lang="en-US"/>
+          </a:p>
+        </p:txBody>
+      </p:sp>
+      <p:cxnSp>
+        <p:nvCxnSpPr>
+          <p:cNvPr id="7" name="Straight Connector 6"/>
+          <p:cNvCxnSpPr>
+            <a:stCxn id="6" idx="4"/>
+          </p:cNvCxnSpPr>
+          <p:nvPr/>
+        </p:nvCxnSpPr>
+        <p:spPr>
+          <a:xfrm flipH="1">
+            <a:off x="2032635" y="2028825"/>
+            <a:ext cx="2540" cy="581025"/>
+          </a:xfrm>
+          <a:prstGeom prst="line">
+            <a:avLst/>
+          </a:prstGeom>
+        </p:spPr>
+        <p:style>
+          <a:lnRef idx="1">
+            <a:schemeClr val="accent1"/>
+          </a:lnRef>
+          <a:fillRef idx="0">
+            <a:schemeClr val="accent1"/>
+          </a:fillRef>
+          <a:effectRef idx="0">
+            <a:schemeClr val="accent1"/>
+          </a:effectRef>
+          <a:fontRef idx="minor">
+            <a:schemeClr val="tx1"/>
+          </a:fontRef>
+        </p:style>
+      </p:cxnSp>
+      <p:sp>
+        <p:nvSpPr>
+          <p:cNvPr id="8" name="Flowchart: Data 7"/>
+          <p:cNvSpPr/>
+          <p:nvPr/>
+        </p:nvSpPr>
+        <p:spPr>
+          <a:xfrm>
+            <a:off x="548640" y="2388235"/>
+            <a:ext cx="2973070" cy="619760"/>
+          </a:xfrm>
+          <a:prstGeom prst="flowChartInputOutput">
+            <a:avLst/>
+          </a:prstGeom>
+        </p:spPr>
+        <p:style>
+          <a:lnRef idx="2">
+            <a:schemeClr val="accent1">
+              <a:shade val="50000"/>
+            </a:schemeClr>
+          </a:lnRef>
+          <a:fillRef idx="1">
+            <a:schemeClr val="accent1"/>
+          </a:fillRef>
+          <a:effectRef idx="0">
+            <a:schemeClr val="accent1"/>
+          </a:effectRef>
+          <a:fontRef idx="minor">
+            <a:schemeClr val="lt1"/>
+          </a:fontRef>
+        </p:style>
+        <p:txBody>
+          <a:bodyPr rtlCol="0" anchor="ctr"/>
+          <a:p>
+            <a:pPr algn="ctr"/>
+            <a:endParaRPr lang="en-US"/>
+          </a:p>
+        </p:txBody>
+      </p:sp>
+      <p:cxnSp>
+        <p:nvCxnSpPr>
+          <p:cNvPr id="2" name="Straight Connector 1"/>
+          <p:cNvCxnSpPr/>
+          <p:nvPr/>
+        </p:nvCxnSpPr>
+        <p:spPr>
+          <a:xfrm>
+            <a:off x="1892300" y="3007995"/>
+            <a:ext cx="16510" cy="800100"/>
+          </a:xfrm>
+          <a:prstGeom prst="line">
+            <a:avLst/>
+          </a:prstGeom>
+        </p:spPr>
+        <p:style>
+          <a:lnRef idx="1">
+            <a:schemeClr val="accent1"/>
+          </a:lnRef>
+          <a:fillRef idx="0">
+            <a:schemeClr val="accent1"/>
+          </a:fillRef>
+          <a:effectRef idx="0">
+            <a:schemeClr val="accent1"/>
+          </a:effectRef>
+          <a:fontRef idx="minor">
+            <a:schemeClr val="tx1"/>
+          </a:fontRef>
+        </p:style>
+      </p:cxnSp>
+      <p:sp>
+        <p:nvSpPr>
+          <p:cNvPr id="3" name="Diamond 2"/>
+          <p:cNvSpPr/>
+          <p:nvPr/>
+        </p:nvSpPr>
+        <p:spPr>
+          <a:xfrm>
+            <a:off x="1223010" y="3808095"/>
+            <a:ext cx="1355090" cy="864870"/>
+          </a:xfrm>
+          <a:prstGeom prst="diamond">
+            <a:avLst/>
+          </a:prstGeom>
+        </p:spPr>
+        <p:style>
+          <a:lnRef idx="2">
+            <a:schemeClr val="accent1">
+              <a:shade val="50000"/>
+            </a:schemeClr>
+          </a:lnRef>
+          <a:fillRef idx="1">
+            <a:schemeClr val="accent1"/>
+          </a:fillRef>
+          <a:effectRef idx="0">
+            <a:schemeClr val="accent1"/>
+          </a:effectRef>
+          <a:fontRef idx="minor">
+            <a:schemeClr val="lt1"/>
+          </a:fontRef>
+        </p:style>
+        <p:txBody>
+          <a:bodyPr rtlCol="0" anchor="ctr"/>
+          <a:p>
+            <a:pPr algn="ctr"/>
+            <a:endParaRPr lang="en-US"/>
+          </a:p>
+        </p:txBody>
+      </p:sp>
+      <p:cxnSp>
+        <p:nvCxnSpPr>
+          <p:cNvPr id="9" name="Straight Connector 8"/>
+          <p:cNvCxnSpPr>
+            <a:stCxn id="6" idx="2"/>
+          </p:cNvCxnSpPr>
+          <p:nvPr/>
+        </p:nvCxnSpPr>
+        <p:spPr>
+          <a:xfrm flipV="1">
+            <a:off x="3058160" y="1494155"/>
+            <a:ext cx="1511300" cy="258445"/>
+          </a:xfrm>
+          <a:prstGeom prst="line">
+            <a:avLst/>
+          </a:prstGeom>
+        </p:spPr>
+        <p:style>
+          <a:lnRef idx="1">
+            <a:schemeClr val="accent1"/>
+          </a:lnRef>
+          <a:fillRef idx="0">
+            <a:schemeClr val="accent1"/>
+          </a:fillRef>
+          <a:effectRef idx="0">
+            <a:schemeClr val="accent1"/>
+          </a:effectRef>
+          <a:fontRef idx="minor">
+            <a:schemeClr val="tx1"/>
+          </a:fontRef>
+        </p:style>
+      </p:cxnSp>
+      <p:cxnSp>
+        <p:nvCxnSpPr>
+          <p:cNvPr id="10" name="Straight Connector 9"/>
+          <p:cNvCxnSpPr/>
+          <p:nvPr/>
+        </p:nvCxnSpPr>
+        <p:spPr>
+          <a:xfrm flipV="1">
+            <a:off x="3051810" y="2609850"/>
+            <a:ext cx="1517650" cy="260985"/>
+          </a:xfrm>
+          <a:prstGeom prst="line">
+            <a:avLst/>
+          </a:prstGeom>
+        </p:spPr>
+        <p:style>
+          <a:lnRef idx="1">
+            <a:schemeClr val="accent1"/>
+          </a:lnRef>
+          <a:fillRef idx="0">
+            <a:schemeClr val="accent1"/>
+          </a:fillRef>
+          <a:effectRef idx="0">
+            <a:schemeClr val="accent1"/>
+          </a:effectRef>
+          <a:fontRef idx="minor">
+            <a:schemeClr val="tx1"/>
+          </a:fontRef>
+        </p:style>
+      </p:cxnSp>
+      <p:sp>
+        <p:nvSpPr>
+          <p:cNvPr id="11" name="Diamond 10"/>
+          <p:cNvSpPr/>
+          <p:nvPr/>
+        </p:nvSpPr>
+        <p:spPr>
+          <a:xfrm>
+            <a:off x="4569460" y="854075"/>
+            <a:ext cx="1828165" cy="1174750"/>
+          </a:xfrm>
+          <a:prstGeom prst="diamond">
+            <a:avLst/>
+          </a:prstGeom>
+        </p:spPr>
+        <p:style>
+          <a:lnRef idx="2">
+            <a:schemeClr val="accent1">
+              <a:shade val="50000"/>
+            </a:schemeClr>
+          </a:lnRef>
+          <a:fillRef idx="1">
+            <a:schemeClr val="accent1"/>
+          </a:fillRef>
+          <a:effectRef idx="0">
+            <a:schemeClr val="accent1"/>
+          </a:effectRef>
+          <a:fontRef idx="minor">
+            <a:schemeClr val="lt1"/>
+          </a:fontRef>
+        </p:style>
+        <p:txBody>
+          <a:bodyPr rtlCol="0" anchor="ctr"/>
+          <a:p>
+            <a:pPr algn="ctr"/>
+            <a:endParaRPr lang="en-US"/>
+          </a:p>
+        </p:txBody>
+      </p:sp>
+      <p:sp>
+        <p:nvSpPr>
+          <p:cNvPr id="12" name="Diamond 11"/>
+          <p:cNvSpPr/>
+          <p:nvPr/>
+        </p:nvSpPr>
+        <p:spPr>
+          <a:xfrm>
+            <a:off x="4569460" y="2028825"/>
+            <a:ext cx="1909445" cy="1337945"/>
+          </a:xfrm>
+          <a:prstGeom prst="diamond">
+            <a:avLst/>
+          </a:prstGeom>
+        </p:spPr>
+        <p:style>
+          <a:lnRef idx="2">
+            <a:schemeClr val="accent1">
+              <a:shade val="50000"/>
+            </a:schemeClr>
+          </a:lnRef>
+          <a:fillRef idx="1">
+            <a:schemeClr val="accent1"/>
+          </a:fillRef>
+          <a:effectRef idx="0">
+            <a:schemeClr val="accent1"/>
+          </a:effectRef>
+          <a:fontRef idx="minor">
+            <a:schemeClr val="lt1"/>
+          </a:fontRef>
+        </p:style>
+        <p:txBody>
+          <a:bodyPr rtlCol="0" anchor="ctr"/>
+          <a:p>
+            <a:pPr algn="ctr"/>
+            <a:endParaRPr lang="en-US"/>
+          </a:p>
+        </p:txBody>
+      </p:sp>
+      <p:cxnSp>
+        <p:nvCxnSpPr>
+          <p:cNvPr id="13" name="Straight Connector 12"/>
+          <p:cNvCxnSpPr/>
+          <p:nvPr/>
+        </p:nvCxnSpPr>
+        <p:spPr>
+          <a:xfrm flipV="1">
+            <a:off x="5941060" y="876300"/>
+            <a:ext cx="1093470" cy="375285"/>
+          </a:xfrm>
+          <a:prstGeom prst="line">
+            <a:avLst/>
+          </a:prstGeom>
+        </p:spPr>
+        <p:style>
+          <a:lnRef idx="1">
+            <a:schemeClr val="accent1"/>
+          </a:lnRef>
+          <a:fillRef idx="0">
+            <a:schemeClr val="accent1"/>
+          </a:fillRef>
+          <a:effectRef idx="0">
+            <a:schemeClr val="accent1"/>
+          </a:effectRef>
+          <a:fontRef idx="minor">
+            <a:schemeClr val="tx1"/>
+          </a:fontRef>
+        </p:style>
+      </p:cxnSp>
+      <p:sp>
+        <p:nvSpPr>
+          <p:cNvPr id="14" name="Parallelogram 13"/>
+          <p:cNvSpPr/>
+          <p:nvPr/>
+        </p:nvSpPr>
+        <p:spPr>
+          <a:xfrm>
+            <a:off x="6919595" y="484505"/>
+            <a:ext cx="2807335" cy="767080"/>
+          </a:xfrm>
+          <a:prstGeom prst="parallelogram">
+            <a:avLst/>
+          </a:prstGeom>
+        </p:spPr>
+        <p:style>
+          <a:lnRef idx="2">
+            <a:schemeClr val="accent1">
+              <a:shade val="50000"/>
+            </a:schemeClr>
+          </a:lnRef>
+          <a:fillRef idx="1">
+            <a:schemeClr val="accent1"/>
+          </a:fillRef>
+          <a:effectRef idx="0">
+            <a:schemeClr val="accent1"/>
+          </a:effectRef>
+          <a:fontRef idx="minor">
+            <a:schemeClr val="lt1"/>
+          </a:fontRef>
+        </p:style>
+        <p:txBody>
+          <a:bodyPr rtlCol="0" anchor="ctr"/>
+          <a:p>
+            <a:pPr algn="ctr"/>
+            <a:endParaRPr lang="en-US"/>
+          </a:p>
+        </p:txBody>
+      </p:sp>
+      <p:cxnSp>
+        <p:nvCxnSpPr>
+          <p:cNvPr id="15" name="Straight Connector 14"/>
+          <p:cNvCxnSpPr/>
+          <p:nvPr/>
+        </p:nvCxnSpPr>
+        <p:spPr>
+          <a:xfrm>
+            <a:off x="6397625" y="2609850"/>
+            <a:ext cx="2284730" cy="588010"/>
+          </a:xfrm>
+          <a:prstGeom prst="line">
+            <a:avLst/>
+          </a:prstGeom>
+        </p:spPr>
+        <p:style>
+          <a:lnRef idx="1">
+            <a:schemeClr val="accent1"/>
+          </a:lnRef>
+          <a:fillRef idx="0">
+            <a:schemeClr val="accent1"/>
+          </a:fillRef>
+          <a:effectRef idx="0">
+            <a:schemeClr val="accent1"/>
+          </a:effectRef>
+          <a:fontRef idx="minor">
+            <a:schemeClr val="tx1"/>
+          </a:fontRef>
+        </p:style>
+      </p:cxnSp>
+      <p:sp>
+        <p:nvSpPr>
+          <p:cNvPr id="16" name="Flowchart: Data 15"/>
+          <p:cNvSpPr/>
+          <p:nvPr/>
+        </p:nvSpPr>
+        <p:spPr>
+          <a:xfrm>
+            <a:off x="8388350" y="2870835"/>
+            <a:ext cx="2954655" cy="750570"/>
+          </a:xfrm>
+          <a:prstGeom prst="flowChartInputOutput">
+            <a:avLst/>
+          </a:prstGeom>
+        </p:spPr>
+        <p:style>
+          <a:lnRef idx="2">
+            <a:schemeClr val="accent1">
+              <a:shade val="50000"/>
+            </a:schemeClr>
+          </a:lnRef>
+          <a:fillRef idx="1">
+            <a:schemeClr val="accent1"/>
+          </a:fillRef>
+          <a:effectRef idx="0">
+            <a:schemeClr val="accent1"/>
+          </a:effectRef>
+          <a:fontRef idx="minor">
+            <a:schemeClr val="lt1"/>
+          </a:fontRef>
+        </p:style>
+        <p:txBody>
+          <a:bodyPr rtlCol="0" anchor="ctr"/>
+          <a:p>
+            <a:pPr algn="ctr"/>
+            <a:endParaRPr lang="en-US"/>
+          </a:p>
+        </p:txBody>
+      </p:sp>
     </p:spTree>
   </p:cSld>
   <p:clrMapOvr>

</xml_diff>